<commit_message>
<docs>: update notes. (#9)
</commit_message>
<xml_diff>
--- a/fused_mha/figures/mha.pptx
+++ b/fused_mha/figures/mha.pptx
@@ -112,7 +112,7 @@
   <p:extLst>
     <p:ext uri="{EFAFB233-063F-42B5-8137-9DF3F51BA10A}">
       <p15:sldGuideLst xmlns:p15="http://schemas.microsoft.com/office/powerpoint/2012/main">
-        <p15:guide id="1" orient="horz" pos="2341" userDrawn="1">
+        <p15:guide id="1" orient="horz" pos="2364" userDrawn="1">
           <p15:clr>
             <a:srgbClr val="A4A3A4"/>
           </p15:clr>
@@ -210,7 +210,7 @@
           <a:p>
             <a:fld id="{EE564C9D-DE4F-8949-AD8A-28D222DBA374}" type="datetimeFigureOut">
               <a:rPr kumimoji="1" lang="zh-CN" altLang="en-US" smtClean="0"/>
-              <a:t>2023/7/17</a:t>
+              <a:t>2023/7/19</a:t>
             </a:fld>
             <a:endParaRPr kumimoji="1" lang="zh-CN" altLang="en-US"/>
           </a:p>
@@ -792,7 +792,7 @@
           <a:p>
             <a:fld id="{193C31CE-65CC-B14E-AE4D-5045B114F27A}" type="datetimeFigureOut">
               <a:rPr kumimoji="1" lang="zh-CN" altLang="en-US" smtClean="0"/>
-              <a:t>2023/7/17</a:t>
+              <a:t>2023/7/19</a:t>
             </a:fld>
             <a:endParaRPr kumimoji="1" lang="zh-CN" altLang="en-US"/>
           </a:p>
@@ -990,7 +990,7 @@
           <a:p>
             <a:fld id="{193C31CE-65CC-B14E-AE4D-5045B114F27A}" type="datetimeFigureOut">
               <a:rPr kumimoji="1" lang="zh-CN" altLang="en-US" smtClean="0"/>
-              <a:t>2023/7/17</a:t>
+              <a:t>2023/7/19</a:t>
             </a:fld>
             <a:endParaRPr kumimoji="1" lang="zh-CN" altLang="en-US"/>
           </a:p>
@@ -1198,7 +1198,7 @@
           <a:p>
             <a:fld id="{193C31CE-65CC-B14E-AE4D-5045B114F27A}" type="datetimeFigureOut">
               <a:rPr kumimoji="1" lang="zh-CN" altLang="en-US" smtClean="0"/>
-              <a:t>2023/7/17</a:t>
+              <a:t>2023/7/19</a:t>
             </a:fld>
             <a:endParaRPr kumimoji="1" lang="zh-CN" altLang="en-US"/>
           </a:p>
@@ -1396,7 +1396,7 @@
           <a:p>
             <a:fld id="{193C31CE-65CC-B14E-AE4D-5045B114F27A}" type="datetimeFigureOut">
               <a:rPr kumimoji="1" lang="zh-CN" altLang="en-US" smtClean="0"/>
-              <a:t>2023/7/17</a:t>
+              <a:t>2023/7/19</a:t>
             </a:fld>
             <a:endParaRPr kumimoji="1" lang="zh-CN" altLang="en-US"/>
           </a:p>
@@ -1671,7 +1671,7 @@
           <a:p>
             <a:fld id="{193C31CE-65CC-B14E-AE4D-5045B114F27A}" type="datetimeFigureOut">
               <a:rPr kumimoji="1" lang="zh-CN" altLang="en-US" smtClean="0"/>
-              <a:t>2023/7/17</a:t>
+              <a:t>2023/7/19</a:t>
             </a:fld>
             <a:endParaRPr kumimoji="1" lang="zh-CN" altLang="en-US"/>
           </a:p>
@@ -1936,7 +1936,7 @@
           <a:p>
             <a:fld id="{193C31CE-65CC-B14E-AE4D-5045B114F27A}" type="datetimeFigureOut">
               <a:rPr kumimoji="1" lang="zh-CN" altLang="en-US" smtClean="0"/>
-              <a:t>2023/7/17</a:t>
+              <a:t>2023/7/19</a:t>
             </a:fld>
             <a:endParaRPr kumimoji="1" lang="zh-CN" altLang="en-US"/>
           </a:p>
@@ -2348,7 +2348,7 @@
           <a:p>
             <a:fld id="{193C31CE-65CC-B14E-AE4D-5045B114F27A}" type="datetimeFigureOut">
               <a:rPr kumimoji="1" lang="zh-CN" altLang="en-US" smtClean="0"/>
-              <a:t>2023/7/17</a:t>
+              <a:t>2023/7/19</a:t>
             </a:fld>
             <a:endParaRPr kumimoji="1" lang="zh-CN" altLang="en-US"/>
           </a:p>
@@ -2489,7 +2489,7 @@
           <a:p>
             <a:fld id="{193C31CE-65CC-B14E-AE4D-5045B114F27A}" type="datetimeFigureOut">
               <a:rPr kumimoji="1" lang="zh-CN" altLang="en-US" smtClean="0"/>
-              <a:t>2023/7/17</a:t>
+              <a:t>2023/7/19</a:t>
             </a:fld>
             <a:endParaRPr kumimoji="1" lang="zh-CN" altLang="en-US"/>
           </a:p>
@@ -2602,7 +2602,7 @@
           <a:p>
             <a:fld id="{193C31CE-65CC-B14E-AE4D-5045B114F27A}" type="datetimeFigureOut">
               <a:rPr kumimoji="1" lang="zh-CN" altLang="en-US" smtClean="0"/>
-              <a:t>2023/7/17</a:t>
+              <a:t>2023/7/19</a:t>
             </a:fld>
             <a:endParaRPr kumimoji="1" lang="zh-CN" altLang="en-US"/>
           </a:p>
@@ -2913,7 +2913,7 @@
           <a:p>
             <a:fld id="{193C31CE-65CC-B14E-AE4D-5045B114F27A}" type="datetimeFigureOut">
               <a:rPr kumimoji="1" lang="zh-CN" altLang="en-US" smtClean="0"/>
-              <a:t>2023/7/17</a:t>
+              <a:t>2023/7/19</a:t>
             </a:fld>
             <a:endParaRPr kumimoji="1" lang="zh-CN" altLang="en-US"/>
           </a:p>
@@ -3201,7 +3201,7 @@
           <a:p>
             <a:fld id="{193C31CE-65CC-B14E-AE4D-5045B114F27A}" type="datetimeFigureOut">
               <a:rPr kumimoji="1" lang="zh-CN" altLang="en-US" smtClean="0"/>
-              <a:t>2023/7/17</a:t>
+              <a:t>2023/7/19</a:t>
             </a:fld>
             <a:endParaRPr kumimoji="1" lang="zh-CN" altLang="en-US"/>
           </a:p>
@@ -3442,7 +3442,7 @@
           <a:p>
             <a:fld id="{193C31CE-65CC-B14E-AE4D-5045B114F27A}" type="datetimeFigureOut">
               <a:rPr kumimoji="1" lang="zh-CN" altLang="en-US" smtClean="0"/>
-              <a:t>2023/7/17</a:t>
+              <a:t>2023/7/19</a:t>
             </a:fld>
             <a:endParaRPr kumimoji="1" lang="zh-CN" altLang="en-US"/>
           </a:p>
@@ -7468,7 +7468,7 @@
         </p:nvSpPr>
         <p:spPr>
           <a:xfrm>
-            <a:off x="1593669" y="2447109"/>
+            <a:off x="966652" y="3757749"/>
             <a:ext cx="722811" cy="2621280"/>
           </a:xfrm>
           <a:prstGeom prst="rect">
@@ -7520,7 +7520,7 @@
         </p:nvSpPr>
         <p:spPr>
           <a:xfrm rot="5400000">
-            <a:off x="4292689" y="-317857"/>
+            <a:off x="3665672" y="992783"/>
             <a:ext cx="722811" cy="4397831"/>
           </a:xfrm>
           <a:prstGeom prst="rect">
@@ -7572,7 +7572,7 @@
         </p:nvSpPr>
         <p:spPr>
           <a:xfrm rot="5400000">
-            <a:off x="3275961" y="1486996"/>
+            <a:off x="2648944" y="2797636"/>
             <a:ext cx="722811" cy="788125"/>
           </a:xfrm>
           <a:prstGeom prst="rect">
@@ -7638,7 +7638,7 @@
         </p:nvCxnSpPr>
         <p:spPr>
           <a:xfrm>
-            <a:off x="3243304" y="1384667"/>
+            <a:off x="2616287" y="2695307"/>
             <a:ext cx="788125" cy="0"/>
           </a:xfrm>
           <a:prstGeom prst="straightConnector1">
@@ -7680,7 +7680,7 @@
         </p:nvCxnSpPr>
         <p:spPr>
           <a:xfrm flipV="1">
-            <a:off x="1501593" y="3381103"/>
+            <a:off x="874576" y="4691743"/>
             <a:ext cx="0" cy="376646"/>
           </a:xfrm>
           <a:prstGeom prst="straightConnector1">
@@ -7720,7 +7720,7 @@
         </p:nvSpPr>
         <p:spPr>
           <a:xfrm>
-            <a:off x="4553945" y="1696392"/>
+            <a:off x="3926928" y="3007032"/>
             <a:ext cx="888274" cy="369332"/>
           </a:xfrm>
           <a:prstGeom prst="rect">
@@ -7760,7 +7760,7 @@
         </p:nvSpPr>
         <p:spPr>
           <a:xfrm>
-            <a:off x="1593981" y="3381103"/>
+            <a:off x="966964" y="4691743"/>
             <a:ext cx="722811" cy="338554"/>
           </a:xfrm>
           <a:prstGeom prst="rect">
@@ -7817,7 +7817,7 @@
         </p:nvSpPr>
         <p:spPr>
           <a:xfrm>
-            <a:off x="1718546" y="3861360"/>
+            <a:off x="1074111" y="5193166"/>
             <a:ext cx="444137" cy="369332"/>
           </a:xfrm>
           <a:prstGeom prst="rect">
@@ -7857,7 +7857,7 @@
         </p:nvSpPr>
         <p:spPr>
           <a:xfrm>
-            <a:off x="3000006" y="1011932"/>
+            <a:off x="2335942" y="2358639"/>
             <a:ext cx="2062845" cy="369332"/>
           </a:xfrm>
           <a:prstGeom prst="rect">
@@ -7906,7 +7906,7 @@
         </p:nvSpPr>
         <p:spPr>
           <a:xfrm>
-            <a:off x="1052020" y="3149534"/>
+            <a:off x="425003" y="4460174"/>
             <a:ext cx="461665" cy="801692"/>
           </a:xfrm>
           <a:prstGeom prst="rect">
@@ -7958,7 +7958,7 @@
         </p:nvSpPr>
         <p:spPr>
           <a:xfrm>
-            <a:off x="6945086" y="2447109"/>
+            <a:off x="6469291" y="927063"/>
             <a:ext cx="722811" cy="2621280"/>
           </a:xfrm>
           <a:prstGeom prst="rect">
@@ -8010,7 +8010,7 @@
         </p:nvSpPr>
         <p:spPr>
           <a:xfrm>
-            <a:off x="6945398" y="3381103"/>
+            <a:off x="6469603" y="1861057"/>
             <a:ext cx="722499" cy="338554"/>
           </a:xfrm>
           <a:prstGeom prst="rect">
@@ -8064,7 +8064,7 @@
         </p:nvSpPr>
         <p:spPr>
           <a:xfrm>
-            <a:off x="7084422" y="3910948"/>
+            <a:off x="6608627" y="2390902"/>
             <a:ext cx="444137" cy="369332"/>
           </a:xfrm>
           <a:prstGeom prst="rect">
@@ -8104,7 +8104,7 @@
         </p:nvSpPr>
         <p:spPr>
           <a:xfrm>
-            <a:off x="6429258" y="3660168"/>
+            <a:off x="5802241" y="4970808"/>
             <a:ext cx="446316" cy="369332"/>
           </a:xfrm>
           <a:prstGeom prst="rect">
@@ -8150,7 +8150,7 @@
         </p:nvSpPr>
         <p:spPr>
           <a:xfrm>
-            <a:off x="2455179" y="2447109"/>
+            <a:off x="1828162" y="3757749"/>
             <a:ext cx="4397831" cy="2621280"/>
           </a:xfrm>
           <a:prstGeom prst="rect">
@@ -8183,15 +8183,6 @@
           <a:lstStyle/>
           <a:p>
             <a:pPr algn="ctr"/>
-            <a:r>
-              <a:rPr kumimoji="1" lang="en-US" altLang="zh-CN" dirty="0">
-                <a:solidFill>
-                  <a:schemeClr val="tx1"/>
-                </a:solidFill>
-                <a:latin typeface="Bradley Hand" pitchFamily="2" charset="0"/>
-              </a:rPr>
-              <a:t>P</a:t>
-            </a:r>
             <a:endParaRPr kumimoji="1" lang="zh-CN" altLang="en-US" dirty="0">
               <a:solidFill>
                 <a:schemeClr val="tx1"/>
@@ -8217,7 +8208,7 @@
         </p:nvCxnSpPr>
         <p:spPr>
           <a:xfrm>
-            <a:off x="1577338" y="2381793"/>
+            <a:off x="950321" y="3692433"/>
             <a:ext cx="755470" cy="0"/>
           </a:xfrm>
           <a:prstGeom prst="straightConnector1">
@@ -8259,7 +8250,7 @@
         </p:nvCxnSpPr>
         <p:spPr>
           <a:xfrm flipV="1">
-            <a:off x="2375260" y="1519653"/>
+            <a:off x="1748243" y="2830293"/>
             <a:ext cx="0" cy="722811"/>
           </a:xfrm>
           <a:prstGeom prst="straightConnector1">
@@ -8299,7 +8290,7 @@
         </p:nvSpPr>
         <p:spPr>
           <a:xfrm rot="16200000">
-            <a:off x="1523357" y="1443821"/>
+            <a:off x="896340" y="2754461"/>
             <a:ext cx="1480009" cy="338554"/>
           </a:xfrm>
           <a:prstGeom prst="rect">
@@ -8339,7 +8330,7 @@
         </p:nvSpPr>
         <p:spPr>
           <a:xfrm>
-            <a:off x="1052020" y="2068426"/>
+            <a:off x="425003" y="3379066"/>
             <a:ext cx="1480009" cy="338554"/>
           </a:xfrm>
           <a:prstGeom prst="rect">
@@ -8379,7 +8370,7 @@
         </p:nvSpPr>
         <p:spPr>
           <a:xfrm>
-            <a:off x="6862583" y="2075512"/>
+            <a:off x="6386788" y="555466"/>
             <a:ext cx="1480009" cy="338554"/>
           </a:xfrm>
           <a:prstGeom prst="rect">
@@ -8421,7 +8412,7 @@
         </p:nvCxnSpPr>
         <p:spPr>
           <a:xfrm>
-            <a:off x="6928755" y="2379222"/>
+            <a:off x="6452960" y="859176"/>
             <a:ext cx="755470" cy="0"/>
           </a:xfrm>
           <a:prstGeom prst="straightConnector1">
@@ -8463,7 +8454,7 @@
         </p:nvCxnSpPr>
         <p:spPr>
           <a:xfrm flipV="1">
-            <a:off x="7723866" y="3362057"/>
+            <a:off x="7248071" y="1842011"/>
             <a:ext cx="0" cy="376646"/>
           </a:xfrm>
           <a:prstGeom prst="straightConnector1">
@@ -8503,7 +8494,7 @@
         </p:nvSpPr>
         <p:spPr>
           <a:xfrm>
-            <a:off x="7681594" y="3109256"/>
+            <a:off x="7205799" y="1589210"/>
             <a:ext cx="461665" cy="801692"/>
           </a:xfrm>
           <a:prstGeom prst="rect">
@@ -8543,10 +8534,268 @@
       </p:sp>
       <p:sp>
         <p:nvSpPr>
-          <p:cNvPr id="73" name="文本框 72">
-            <a:extLst>
-              <a:ext uri="{FF2B5EF4-FFF2-40B4-BE49-F238E27FC236}">
-                <a16:creationId xmlns:a16="http://schemas.microsoft.com/office/drawing/2014/main" id="{708D8C3C-2E31-F9EE-E6A3-5BFA206F278B}"/>
+          <p:cNvPr id="2" name="矩形 1">
+            <a:extLst>
+              <a:ext uri="{FF2B5EF4-FFF2-40B4-BE49-F238E27FC236}">
+                <a16:creationId xmlns:a16="http://schemas.microsoft.com/office/drawing/2014/main" id="{DEC4900A-B866-A3BD-C43D-AD32528D301C}"/>
+              </a:ext>
+            </a:extLst>
+          </p:cNvPr>
+          <p:cNvSpPr/>
+          <p:nvPr/>
+        </p:nvSpPr>
+        <p:spPr>
+          <a:xfrm>
+            <a:off x="6469292" y="3757749"/>
+            <a:ext cx="736508" cy="2621280"/>
+          </a:xfrm>
+          <a:prstGeom prst="rect">
+            <a:avLst/>
+          </a:prstGeom>
+          <a:solidFill>
+            <a:schemeClr val="bg2">
+              <a:lumMod val="90000"/>
+            </a:schemeClr>
+          </a:solidFill>
+        </p:spPr>
+        <p:style>
+          <a:lnRef idx="2">
+            <a:schemeClr val="accent1">
+              <a:shade val="15000"/>
+            </a:schemeClr>
+          </a:lnRef>
+          <a:fillRef idx="1">
+            <a:schemeClr val="accent1"/>
+          </a:fillRef>
+          <a:effectRef idx="0">
+            <a:schemeClr val="accent1"/>
+          </a:effectRef>
+          <a:fontRef idx="minor">
+            <a:schemeClr val="lt1"/>
+          </a:fontRef>
+        </p:style>
+        <p:txBody>
+          <a:bodyPr rtlCol="0" anchor="ctr"/>
+          <a:lstStyle/>
+          <a:p>
+            <a:pPr algn="ctr"/>
+            <a:endParaRPr kumimoji="1" lang="zh-CN" altLang="en-US" dirty="0">
+              <a:solidFill>
+                <a:schemeClr val="tx1"/>
+              </a:solidFill>
+              <a:latin typeface="Bradley Hand" pitchFamily="2" charset="0"/>
+            </a:endParaRPr>
+          </a:p>
+        </p:txBody>
+      </p:sp>
+      <p:cxnSp>
+        <p:nvCxnSpPr>
+          <p:cNvPr id="10" name="直线连接符 9">
+            <a:extLst>
+              <a:ext uri="{FF2B5EF4-FFF2-40B4-BE49-F238E27FC236}">
+                <a16:creationId xmlns:a16="http://schemas.microsoft.com/office/drawing/2014/main" id="{7E3C92CE-74EB-03E4-60B4-28E18AE5F15D}"/>
+              </a:ext>
+            </a:extLst>
+          </p:cNvPr>
+          <p:cNvCxnSpPr>
+            <a:cxnSpLocks/>
+          </p:cNvCxnSpPr>
+          <p:nvPr/>
+        </p:nvCxnSpPr>
+        <p:spPr>
+          <a:xfrm flipH="1">
+            <a:off x="2595250" y="2319548"/>
+            <a:ext cx="17704" cy="4281252"/>
+          </a:xfrm>
+          <a:prstGeom prst="line">
+            <a:avLst/>
+          </a:prstGeom>
+          <a:ln w="25400">
+            <a:solidFill>
+              <a:srgbClr val="C00000"/>
+            </a:solidFill>
+            <a:prstDash val="sysDash"/>
+          </a:ln>
+        </p:spPr>
+        <p:style>
+          <a:lnRef idx="1">
+            <a:schemeClr val="accent1"/>
+          </a:lnRef>
+          <a:fillRef idx="0">
+            <a:schemeClr val="accent1"/>
+          </a:fillRef>
+          <a:effectRef idx="0">
+            <a:schemeClr val="accent1"/>
+          </a:effectRef>
+          <a:fontRef idx="minor">
+            <a:schemeClr val="tx1"/>
+          </a:fontRef>
+        </p:style>
+      </p:cxnSp>
+      <p:cxnSp>
+        <p:nvCxnSpPr>
+          <p:cNvPr id="13" name="直线连接符 12">
+            <a:extLst>
+              <a:ext uri="{FF2B5EF4-FFF2-40B4-BE49-F238E27FC236}">
+                <a16:creationId xmlns:a16="http://schemas.microsoft.com/office/drawing/2014/main" id="{B159F485-3D67-24A9-25DD-2F8540263717}"/>
+              </a:ext>
+            </a:extLst>
+          </p:cNvPr>
+          <p:cNvCxnSpPr>
+            <a:cxnSpLocks/>
+          </p:cNvCxnSpPr>
+          <p:nvPr/>
+        </p:nvCxnSpPr>
+        <p:spPr>
+          <a:xfrm flipH="1">
+            <a:off x="3383624" y="2319548"/>
+            <a:ext cx="17704" cy="4281252"/>
+          </a:xfrm>
+          <a:prstGeom prst="line">
+            <a:avLst/>
+          </a:prstGeom>
+          <a:ln w="25400">
+            <a:solidFill>
+              <a:srgbClr val="C00000"/>
+            </a:solidFill>
+            <a:prstDash val="sysDash"/>
+          </a:ln>
+        </p:spPr>
+        <p:style>
+          <a:lnRef idx="1">
+            <a:schemeClr val="accent1"/>
+          </a:lnRef>
+          <a:fillRef idx="0">
+            <a:schemeClr val="accent1"/>
+          </a:fillRef>
+          <a:effectRef idx="0">
+            <a:schemeClr val="accent1"/>
+          </a:effectRef>
+          <a:fontRef idx="minor">
+            <a:schemeClr val="tx1"/>
+          </a:fontRef>
+        </p:style>
+      </p:cxnSp>
+      <p:sp>
+        <p:nvSpPr>
+          <p:cNvPr id="16" name="矩形 15">
+            <a:extLst>
+              <a:ext uri="{FF2B5EF4-FFF2-40B4-BE49-F238E27FC236}">
+                <a16:creationId xmlns:a16="http://schemas.microsoft.com/office/drawing/2014/main" id="{D3B44F7F-907A-5810-01BF-18B912032D8B}"/>
+              </a:ext>
+            </a:extLst>
+          </p:cNvPr>
+          <p:cNvSpPr/>
+          <p:nvPr/>
+        </p:nvSpPr>
+        <p:spPr>
+          <a:xfrm>
+            <a:off x="2614230" y="4691743"/>
+            <a:ext cx="765068" cy="338554"/>
+          </a:xfrm>
+          <a:prstGeom prst="rect">
+            <a:avLst/>
+          </a:prstGeom>
+          <a:pattFill prst="wdUpDiag">
+            <a:fgClr>
+              <a:schemeClr val="tx1">
+                <a:lumMod val="50000"/>
+                <a:lumOff val="50000"/>
+              </a:schemeClr>
+            </a:fgClr>
+            <a:bgClr>
+              <a:schemeClr val="bg1"/>
+            </a:bgClr>
+          </a:pattFill>
+        </p:spPr>
+        <p:style>
+          <a:lnRef idx="2">
+            <a:schemeClr val="accent1">
+              <a:shade val="15000"/>
+            </a:schemeClr>
+          </a:lnRef>
+          <a:fillRef idx="1">
+            <a:schemeClr val="accent1"/>
+          </a:fillRef>
+          <a:effectRef idx="0">
+            <a:schemeClr val="accent1"/>
+          </a:effectRef>
+          <a:fontRef idx="minor">
+            <a:schemeClr val="lt1"/>
+          </a:fontRef>
+        </p:style>
+        <p:txBody>
+          <a:bodyPr rtlCol="0" anchor="ctr"/>
+          <a:lstStyle/>
+          <a:p>
+            <a:pPr algn="ctr"/>
+            <a:endParaRPr kumimoji="1" lang="zh-CN" altLang="en-US"/>
+          </a:p>
+        </p:txBody>
+      </p:sp>
+      <p:sp>
+        <p:nvSpPr>
+          <p:cNvPr id="17" name="矩形 16">
+            <a:extLst>
+              <a:ext uri="{FF2B5EF4-FFF2-40B4-BE49-F238E27FC236}">
+                <a16:creationId xmlns:a16="http://schemas.microsoft.com/office/drawing/2014/main" id="{9F786B7D-EA38-1BA0-0511-E710EEF524C7}"/>
+              </a:ext>
+            </a:extLst>
+          </p:cNvPr>
+          <p:cNvSpPr/>
+          <p:nvPr/>
+        </p:nvSpPr>
+        <p:spPr>
+          <a:xfrm>
+            <a:off x="6469291" y="4712026"/>
+            <a:ext cx="722811" cy="338554"/>
+          </a:xfrm>
+          <a:prstGeom prst="rect">
+            <a:avLst/>
+          </a:prstGeom>
+          <a:pattFill prst="wdUpDiag">
+            <a:fgClr>
+              <a:schemeClr val="tx1">
+                <a:lumMod val="50000"/>
+                <a:lumOff val="50000"/>
+              </a:schemeClr>
+            </a:fgClr>
+            <a:bgClr>
+              <a:schemeClr val="bg1"/>
+            </a:bgClr>
+          </a:pattFill>
+        </p:spPr>
+        <p:style>
+          <a:lnRef idx="2">
+            <a:schemeClr val="accent1">
+              <a:shade val="15000"/>
+            </a:schemeClr>
+          </a:lnRef>
+          <a:fillRef idx="1">
+            <a:schemeClr val="accent1"/>
+          </a:fillRef>
+          <a:effectRef idx="0">
+            <a:schemeClr val="accent1"/>
+          </a:effectRef>
+          <a:fontRef idx="minor">
+            <a:schemeClr val="lt1"/>
+          </a:fontRef>
+        </p:style>
+        <p:txBody>
+          <a:bodyPr rtlCol="0" anchor="ctr"/>
+          <a:lstStyle/>
+          <a:p>
+            <a:pPr algn="ctr"/>
+            <a:endParaRPr kumimoji="1" lang="zh-CN" altLang="en-US"/>
+          </a:p>
+        </p:txBody>
+      </p:sp>
+      <p:sp>
+        <p:nvSpPr>
+          <p:cNvPr id="19" name="文本框 18">
+            <a:extLst>
+              <a:ext uri="{FF2B5EF4-FFF2-40B4-BE49-F238E27FC236}">
+                <a16:creationId xmlns:a16="http://schemas.microsoft.com/office/drawing/2014/main" id="{03203BC8-A425-FD67-6EDE-150D28EE1533}"/>
               </a:ext>
             </a:extLst>
           </p:cNvPr>
@@ -8555,8 +8804,8 @@
         </p:nvSpPr>
         <p:spPr>
           <a:xfrm>
-            <a:off x="1193713" y="4362540"/>
-            <a:ext cx="522514" cy="369332"/>
+            <a:off x="3756473" y="5193166"/>
+            <a:ext cx="888274" cy="369332"/>
           </a:xfrm>
           <a:prstGeom prst="rect">
             <a:avLst/>
@@ -8571,26 +8820,11 @@
           <a:p>
             <a:r>
               <a:rPr kumimoji="1" lang="en-US" altLang="zh-CN" dirty="0">
-                <a:solidFill>
-                  <a:srgbClr val="FF0000"/>
-                </a:solidFill>
                 <a:latin typeface="Bradley Hand" pitchFamily="2" charset="0"/>
               </a:rPr>
-              <a:t>M</a:t>
-            </a:r>
-            <a:r>
-              <a:rPr kumimoji="1" lang="en-US" altLang="zh-CN" baseline="-25000" dirty="0">
-                <a:solidFill>
-                  <a:srgbClr val="FF0000"/>
-                </a:solidFill>
-                <a:latin typeface="Bradley Hand" pitchFamily="2" charset="0"/>
-              </a:rPr>
-              <a:t>1</a:t>
-            </a:r>
-            <a:endParaRPr kumimoji="1" lang="zh-CN" altLang="en-US" baseline="-25000" dirty="0">
-              <a:solidFill>
-                <a:srgbClr val="FF0000"/>
-              </a:solidFill>
+              <a:t>P</a:t>
+            </a:r>
+            <a:endParaRPr kumimoji="1" lang="zh-CN" altLang="en-US" dirty="0">
               <a:latin typeface="Bradley Hand" pitchFamily="2" charset="0"/>
             </a:endParaRPr>
           </a:p>
@@ -8598,10 +8832,10 @@
       </p:sp>
       <p:sp>
         <p:nvSpPr>
-          <p:cNvPr id="74" name="文本框 73">
-            <a:extLst>
-              <a:ext uri="{FF2B5EF4-FFF2-40B4-BE49-F238E27FC236}">
-                <a16:creationId xmlns:a16="http://schemas.microsoft.com/office/drawing/2014/main" id="{CF7895A0-F631-486E-23B1-0AF06D910973}"/>
+          <p:cNvPr id="20" name="文本框 19">
+            <a:extLst>
+              <a:ext uri="{FF2B5EF4-FFF2-40B4-BE49-F238E27FC236}">
+                <a16:creationId xmlns:a16="http://schemas.microsoft.com/office/drawing/2014/main" id="{661D6DA0-BA18-EEEF-C9C1-C91A7B210A8A}"/>
               </a:ext>
             </a:extLst>
           </p:cNvPr>
@@ -8610,8 +8844,8 @@
         </p:nvSpPr>
         <p:spPr>
           <a:xfrm>
-            <a:off x="1783522" y="5108518"/>
-            <a:ext cx="522514" cy="369332"/>
+            <a:off x="6665237" y="5193166"/>
+            <a:ext cx="888274" cy="369332"/>
           </a:xfrm>
           <a:prstGeom prst="rect">
             <a:avLst/>
@@ -8626,251 +8860,280 @@
           <a:p>
             <a:r>
               <a:rPr kumimoji="1" lang="en-US" altLang="zh-CN" dirty="0">
-                <a:solidFill>
-                  <a:srgbClr val="FF0000"/>
-                </a:solidFill>
                 <a:latin typeface="Bradley Hand" pitchFamily="2" charset="0"/>
               </a:rPr>
-              <a:t>K</a:t>
-            </a:r>
-            <a:r>
-              <a:rPr kumimoji="1" lang="en-US" altLang="zh-CN" baseline="-25000" dirty="0">
-                <a:solidFill>
-                  <a:srgbClr val="FF0000"/>
-                </a:solidFill>
-                <a:latin typeface="Bradley Hand" pitchFamily="2" charset="0"/>
-              </a:rPr>
-              <a:t>1</a:t>
-            </a:r>
-            <a:endParaRPr kumimoji="1" lang="zh-CN" altLang="en-US" baseline="-25000" dirty="0">
-              <a:solidFill>
-                <a:srgbClr val="FF0000"/>
-              </a:solidFill>
+              <a:t>O</a:t>
+            </a:r>
+            <a:endParaRPr kumimoji="1" lang="zh-CN" altLang="en-US" dirty="0">
               <a:latin typeface="Bradley Hand" pitchFamily="2" charset="0"/>
             </a:endParaRPr>
           </a:p>
         </p:txBody>
       </p:sp>
-      <p:sp>
-        <p:nvSpPr>
-          <p:cNvPr id="75" name="文本框 74">
-            <a:extLst>
-              <a:ext uri="{FF2B5EF4-FFF2-40B4-BE49-F238E27FC236}">
-                <a16:creationId xmlns:a16="http://schemas.microsoft.com/office/drawing/2014/main" id="{0A4D037A-E49F-50DD-BA6E-CC1D2FE6FC48}"/>
-              </a:ext>
-            </a:extLst>
-          </p:cNvPr>
-          <p:cNvSpPr txBox="1"/>
+      <p:cxnSp>
+        <p:nvCxnSpPr>
+          <p:cNvPr id="9" name="直线连接符 8">
+            <a:extLst>
+              <a:ext uri="{FF2B5EF4-FFF2-40B4-BE49-F238E27FC236}">
+                <a16:creationId xmlns:a16="http://schemas.microsoft.com/office/drawing/2014/main" id="{07947E84-1D8D-E368-FB86-B908FD72C42D}"/>
+              </a:ext>
+            </a:extLst>
+          </p:cNvPr>
+          <p:cNvCxnSpPr>
+            <a:cxnSpLocks/>
+          </p:cNvCxnSpPr>
           <p:nvPr/>
-        </p:nvSpPr>
+        </p:nvCxnSpPr>
         <p:spPr>
           <a:xfrm>
-            <a:off x="4297040" y="1171253"/>
-            <a:ext cx="522514" cy="369332"/>
-          </a:xfrm>
-          <a:prstGeom prst="rect">
+            <a:off x="886668" y="5039006"/>
+            <a:ext cx="6893470" cy="0"/>
+          </a:xfrm>
+          <a:prstGeom prst="line">
             <a:avLst/>
           </a:prstGeom>
-          <a:noFill/>
-        </p:spPr>
-        <p:txBody>
-          <a:bodyPr wrap="square" rtlCol="0">
-            <a:spAutoFit/>
-          </a:bodyPr>
-          <a:lstStyle/>
-          <a:p>
-            <a:r>
-              <a:rPr kumimoji="1" lang="en-US" altLang="zh-CN" dirty="0">
-                <a:solidFill>
-                  <a:srgbClr val="FF0000"/>
-                </a:solidFill>
-                <a:latin typeface="Bradley Hand" pitchFamily="2" charset="0"/>
-              </a:rPr>
-              <a:t>N</a:t>
-            </a:r>
-            <a:r>
-              <a:rPr kumimoji="1" lang="en-US" altLang="zh-CN" baseline="-25000" dirty="0">
-                <a:solidFill>
-                  <a:srgbClr val="FF0000"/>
-                </a:solidFill>
-                <a:latin typeface="Bradley Hand" pitchFamily="2" charset="0"/>
-              </a:rPr>
-              <a:t>1</a:t>
-            </a:r>
-            <a:endParaRPr kumimoji="1" lang="zh-CN" altLang="en-US" baseline="-25000" dirty="0">
-              <a:solidFill>
-                <a:srgbClr val="FF0000"/>
-              </a:solidFill>
-              <a:latin typeface="Bradley Hand" pitchFamily="2" charset="0"/>
-            </a:endParaRPr>
-          </a:p>
-        </p:txBody>
-      </p:sp>
-      <p:sp>
-        <p:nvSpPr>
-          <p:cNvPr id="76" name="文本框 75">
-            <a:extLst>
-              <a:ext uri="{FF2B5EF4-FFF2-40B4-BE49-F238E27FC236}">
-                <a16:creationId xmlns:a16="http://schemas.microsoft.com/office/drawing/2014/main" id="{3CA9C7D4-A223-6679-8AD8-0901B622E2A4}"/>
-              </a:ext>
-            </a:extLst>
-          </p:cNvPr>
-          <p:cNvSpPr txBox="1"/>
+          <a:ln w="25400">
+            <a:solidFill>
+              <a:srgbClr val="C00000"/>
+            </a:solidFill>
+            <a:prstDash val="sysDash"/>
+          </a:ln>
+        </p:spPr>
+        <p:style>
+          <a:lnRef idx="1">
+            <a:schemeClr val="accent1"/>
+          </a:lnRef>
+          <a:fillRef idx="0">
+            <a:schemeClr val="accent1"/>
+          </a:fillRef>
+          <a:effectRef idx="0">
+            <a:schemeClr val="accent1"/>
+          </a:effectRef>
+          <a:fontRef idx="minor">
+            <a:schemeClr val="tx1"/>
+          </a:fontRef>
+        </p:style>
+      </p:cxnSp>
+      <p:cxnSp>
+        <p:nvCxnSpPr>
+          <p:cNvPr id="6" name="直线连接符 5">
+            <a:extLst>
+              <a:ext uri="{FF2B5EF4-FFF2-40B4-BE49-F238E27FC236}">
+                <a16:creationId xmlns:a16="http://schemas.microsoft.com/office/drawing/2014/main" id="{B44E177A-2DF5-A568-90C7-B2EDCC92B137}"/>
+              </a:ext>
+            </a:extLst>
+          </p:cNvPr>
+          <p:cNvCxnSpPr>
+            <a:cxnSpLocks/>
+          </p:cNvCxnSpPr>
           <p:nvPr/>
-        </p:nvSpPr>
+        </p:nvCxnSpPr>
         <p:spPr>
           <a:xfrm>
-            <a:off x="4392837" y="2447109"/>
-            <a:ext cx="522514" cy="369332"/>
-          </a:xfrm>
-          <a:prstGeom prst="rect">
+            <a:off x="874576" y="4700452"/>
+            <a:ext cx="6893470" cy="0"/>
+          </a:xfrm>
+          <a:prstGeom prst="line">
             <a:avLst/>
           </a:prstGeom>
-          <a:noFill/>
-        </p:spPr>
-        <p:txBody>
-          <a:bodyPr wrap="square" rtlCol="0">
-            <a:spAutoFit/>
-          </a:bodyPr>
-          <a:lstStyle/>
-          <a:p>
-            <a:r>
-              <a:rPr kumimoji="1" lang="en-US" altLang="zh-CN" dirty="0">
-                <a:solidFill>
-                  <a:srgbClr val="FF0000"/>
-                </a:solidFill>
-                <a:latin typeface="Bradley Hand" pitchFamily="2" charset="0"/>
-              </a:rPr>
-              <a:t>K</a:t>
-            </a:r>
-            <a:r>
-              <a:rPr kumimoji="1" lang="en-US" altLang="zh-CN" baseline="-25000" dirty="0">
-                <a:solidFill>
-                  <a:srgbClr val="FF0000"/>
-                </a:solidFill>
-                <a:latin typeface="Bradley Hand" pitchFamily="2" charset="0"/>
-              </a:rPr>
-              <a:t>2</a:t>
-            </a:r>
-            <a:endParaRPr kumimoji="1" lang="zh-CN" altLang="en-US" baseline="-25000" dirty="0">
-              <a:solidFill>
-                <a:srgbClr val="FF0000"/>
-              </a:solidFill>
-              <a:latin typeface="Bradley Hand" pitchFamily="2" charset="0"/>
-            </a:endParaRPr>
-          </a:p>
-        </p:txBody>
-      </p:sp>
-      <p:sp>
-        <p:nvSpPr>
-          <p:cNvPr id="77" name="文本框 76">
-            <a:extLst>
-              <a:ext uri="{FF2B5EF4-FFF2-40B4-BE49-F238E27FC236}">
-                <a16:creationId xmlns:a16="http://schemas.microsoft.com/office/drawing/2014/main" id="{1088B952-8CE9-2FD8-EACB-590C00EFF5D0}"/>
-              </a:ext>
-            </a:extLst>
-          </p:cNvPr>
-          <p:cNvSpPr txBox="1"/>
+          <a:ln w="25400">
+            <a:solidFill>
+              <a:srgbClr val="C00000"/>
+            </a:solidFill>
+            <a:prstDash val="sysDash"/>
+          </a:ln>
+        </p:spPr>
+        <p:style>
+          <a:lnRef idx="1">
+            <a:schemeClr val="accent1"/>
+          </a:lnRef>
+          <a:fillRef idx="0">
+            <a:schemeClr val="accent1"/>
+          </a:fillRef>
+          <a:effectRef idx="0">
+            <a:schemeClr val="accent1"/>
+          </a:effectRef>
+          <a:fontRef idx="minor">
+            <a:schemeClr val="tx1"/>
+          </a:fontRef>
+        </p:style>
+      </p:cxnSp>
+      <p:cxnSp>
+        <p:nvCxnSpPr>
+          <p:cNvPr id="14" name="直线连接符 13">
+            <a:extLst>
+              <a:ext uri="{FF2B5EF4-FFF2-40B4-BE49-F238E27FC236}">
+                <a16:creationId xmlns:a16="http://schemas.microsoft.com/office/drawing/2014/main" id="{C6F6CE6C-A238-DD45-5301-A7EBC8CD1E3E}"/>
+              </a:ext>
+            </a:extLst>
+          </p:cNvPr>
+          <p:cNvCxnSpPr>
+            <a:cxnSpLocks/>
+          </p:cNvCxnSpPr>
           <p:nvPr/>
-        </p:nvSpPr>
-        <p:spPr>
-          <a:xfrm>
-            <a:off x="2477492" y="3429637"/>
-            <a:ext cx="522514" cy="369332"/>
-          </a:xfrm>
-          <a:prstGeom prst="rect">
+        </p:nvCxnSpPr>
+        <p:spPr>
+          <a:xfrm flipH="1">
+            <a:off x="7183770" y="980614"/>
+            <a:ext cx="17704" cy="4281252"/>
+          </a:xfrm>
+          <a:prstGeom prst="line">
             <a:avLst/>
           </a:prstGeom>
-          <a:noFill/>
-        </p:spPr>
-        <p:txBody>
-          <a:bodyPr wrap="square" rtlCol="0">
-            <a:spAutoFit/>
-          </a:bodyPr>
-          <a:lstStyle/>
-          <a:p>
-            <a:r>
-              <a:rPr kumimoji="1" lang="en-US" altLang="zh-CN" dirty="0">
-                <a:solidFill>
-                  <a:srgbClr val="FF0000"/>
-                </a:solidFill>
-                <a:latin typeface="Bradley Hand" pitchFamily="2" charset="0"/>
-              </a:rPr>
-              <a:t>M</a:t>
-            </a:r>
-            <a:r>
-              <a:rPr kumimoji="1" lang="en-US" altLang="zh-CN" baseline="-25000" dirty="0">
-                <a:solidFill>
-                  <a:srgbClr val="FF0000"/>
-                </a:solidFill>
-                <a:latin typeface="Bradley Hand" pitchFamily="2" charset="0"/>
-              </a:rPr>
-              <a:t>2</a:t>
-            </a:r>
-            <a:endParaRPr kumimoji="1" lang="zh-CN" altLang="en-US" baseline="-25000" dirty="0">
-              <a:solidFill>
-                <a:srgbClr val="FF0000"/>
-              </a:solidFill>
-              <a:latin typeface="Bradley Hand" pitchFamily="2" charset="0"/>
-            </a:endParaRPr>
-          </a:p>
-        </p:txBody>
-      </p:sp>
-      <p:sp>
-        <p:nvSpPr>
-          <p:cNvPr id="78" name="文本框 77">
-            <a:extLst>
-              <a:ext uri="{FF2B5EF4-FFF2-40B4-BE49-F238E27FC236}">
-                <a16:creationId xmlns:a16="http://schemas.microsoft.com/office/drawing/2014/main" id="{50F4674C-62DC-A332-D214-CCB60C142993}"/>
-              </a:ext>
-            </a:extLst>
-          </p:cNvPr>
-          <p:cNvSpPr txBox="1"/>
+          <a:ln w="25400">
+            <a:solidFill>
+              <a:srgbClr val="C00000"/>
+            </a:solidFill>
+            <a:prstDash val="sysDash"/>
+          </a:ln>
+        </p:spPr>
+        <p:style>
+          <a:lnRef idx="1">
+            <a:schemeClr val="accent1"/>
+          </a:lnRef>
+          <a:fillRef idx="0">
+            <a:schemeClr val="accent1"/>
+          </a:fillRef>
+          <a:effectRef idx="0">
+            <a:schemeClr val="accent1"/>
+          </a:effectRef>
+          <a:fontRef idx="minor">
+            <a:schemeClr val="tx1"/>
+          </a:fontRef>
+        </p:style>
+      </p:cxnSp>
+      <p:cxnSp>
+        <p:nvCxnSpPr>
+          <p:cNvPr id="15" name="直线连接符 14">
+            <a:extLst>
+              <a:ext uri="{FF2B5EF4-FFF2-40B4-BE49-F238E27FC236}">
+                <a16:creationId xmlns:a16="http://schemas.microsoft.com/office/drawing/2014/main" id="{5A0558B6-EEEF-1398-F068-8E71C8079EBE}"/>
+              </a:ext>
+            </a:extLst>
+          </p:cNvPr>
+          <p:cNvCxnSpPr>
+            <a:cxnSpLocks/>
+          </p:cNvCxnSpPr>
           <p:nvPr/>
-        </p:nvSpPr>
-        <p:spPr>
-          <a:xfrm>
-            <a:off x="7201352" y="1824590"/>
-            <a:ext cx="522514" cy="369332"/>
-          </a:xfrm>
-          <a:prstGeom prst="rect">
+        </p:nvCxnSpPr>
+        <p:spPr>
+          <a:xfrm flipH="1">
+            <a:off x="6462248" y="933700"/>
+            <a:ext cx="17704" cy="4281252"/>
+          </a:xfrm>
+          <a:prstGeom prst="line">
             <a:avLst/>
           </a:prstGeom>
-          <a:noFill/>
-        </p:spPr>
-        <p:txBody>
-          <a:bodyPr wrap="square" rtlCol="0">
-            <a:spAutoFit/>
-          </a:bodyPr>
-          <a:lstStyle/>
-          <a:p>
-            <a:r>
-              <a:rPr kumimoji="1" lang="en-US" altLang="zh-CN" dirty="0">
-                <a:solidFill>
-                  <a:srgbClr val="FF0000"/>
-                </a:solidFill>
-                <a:latin typeface="Bradley Hand" pitchFamily="2" charset="0"/>
-              </a:rPr>
-              <a:t>N</a:t>
-            </a:r>
-            <a:r>
-              <a:rPr kumimoji="1" lang="en-US" altLang="zh-CN" baseline="-25000" dirty="0">
-                <a:solidFill>
-                  <a:srgbClr val="FF0000"/>
-                </a:solidFill>
-                <a:latin typeface="Bradley Hand" pitchFamily="2" charset="0"/>
-              </a:rPr>
-              <a:t>2</a:t>
-            </a:r>
-            <a:endParaRPr kumimoji="1" lang="zh-CN" altLang="en-US" baseline="-25000" dirty="0">
-              <a:solidFill>
-                <a:srgbClr val="FF0000"/>
-              </a:solidFill>
-              <a:latin typeface="Bradley Hand" pitchFamily="2" charset="0"/>
-            </a:endParaRPr>
-          </a:p>
-        </p:txBody>
-      </p:sp>
+          <a:ln w="25400">
+            <a:solidFill>
+              <a:srgbClr val="C00000"/>
+            </a:solidFill>
+            <a:prstDash val="sysDash"/>
+          </a:ln>
+        </p:spPr>
+        <p:style>
+          <a:lnRef idx="1">
+            <a:schemeClr val="accent1"/>
+          </a:lnRef>
+          <a:fillRef idx="0">
+            <a:schemeClr val="accent1"/>
+          </a:fillRef>
+          <a:effectRef idx="0">
+            <a:schemeClr val="accent1"/>
+          </a:effectRef>
+          <a:fontRef idx="minor">
+            <a:schemeClr val="tx1"/>
+          </a:fontRef>
+        </p:style>
+      </p:cxnSp>
+      <p:cxnSp>
+        <p:nvCxnSpPr>
+          <p:cNvPr id="22" name="直线连接符 21">
+            <a:extLst>
+              <a:ext uri="{FF2B5EF4-FFF2-40B4-BE49-F238E27FC236}">
+                <a16:creationId xmlns:a16="http://schemas.microsoft.com/office/drawing/2014/main" id="{3806AEB2-B4CF-82E6-7F10-7E5A2FDD8E4D}"/>
+              </a:ext>
+            </a:extLst>
+          </p:cNvPr>
+          <p:cNvCxnSpPr>
+            <a:cxnSpLocks/>
+          </p:cNvCxnSpPr>
+          <p:nvPr/>
+        </p:nvCxnSpPr>
+        <p:spPr>
+          <a:xfrm>
+            <a:off x="6313714" y="1869767"/>
+            <a:ext cx="1036320" cy="0"/>
+          </a:xfrm>
+          <a:prstGeom prst="line">
+            <a:avLst/>
+          </a:prstGeom>
+          <a:ln w="25400">
+            <a:solidFill>
+              <a:srgbClr val="C00000"/>
+            </a:solidFill>
+            <a:prstDash val="sysDash"/>
+          </a:ln>
+        </p:spPr>
+        <p:style>
+          <a:lnRef idx="1">
+            <a:schemeClr val="accent1"/>
+          </a:lnRef>
+          <a:fillRef idx="0">
+            <a:schemeClr val="accent1"/>
+          </a:fillRef>
+          <a:effectRef idx="0">
+            <a:schemeClr val="accent1"/>
+          </a:effectRef>
+          <a:fontRef idx="minor">
+            <a:schemeClr val="tx1"/>
+          </a:fontRef>
+        </p:style>
+      </p:cxnSp>
+      <p:cxnSp>
+        <p:nvCxnSpPr>
+          <p:cNvPr id="27" name="直线连接符 26">
+            <a:extLst>
+              <a:ext uri="{FF2B5EF4-FFF2-40B4-BE49-F238E27FC236}">
+                <a16:creationId xmlns:a16="http://schemas.microsoft.com/office/drawing/2014/main" id="{F57072C5-6559-D641-0C2E-A8DCE7A93A9E}"/>
+              </a:ext>
+            </a:extLst>
+          </p:cNvPr>
+          <p:cNvCxnSpPr>
+            <a:cxnSpLocks/>
+          </p:cNvCxnSpPr>
+          <p:nvPr/>
+        </p:nvCxnSpPr>
+        <p:spPr>
+          <a:xfrm>
+            <a:off x="6310677" y="2203018"/>
+            <a:ext cx="1036320" cy="0"/>
+          </a:xfrm>
+          <a:prstGeom prst="line">
+            <a:avLst/>
+          </a:prstGeom>
+          <a:ln w="25400">
+            <a:solidFill>
+              <a:srgbClr val="C00000"/>
+            </a:solidFill>
+            <a:prstDash val="sysDash"/>
+          </a:ln>
+        </p:spPr>
+        <p:style>
+          <a:lnRef idx="1">
+            <a:schemeClr val="accent1"/>
+          </a:lnRef>
+          <a:fillRef idx="0">
+            <a:schemeClr val="accent1"/>
+          </a:fillRef>
+          <a:effectRef idx="0">
+            <a:schemeClr val="accent1"/>
+          </a:effectRef>
+          <a:fontRef idx="minor">
+            <a:schemeClr val="tx1"/>
+          </a:fontRef>
+        </p:style>
+      </p:cxnSp>
     </p:spTree>
     <p:extLst>
       <p:ext uri="{BB962C8B-B14F-4D97-AF65-F5344CB8AC3E}">

</xml_diff>